<commit_message>
Added demo setup diagram to presentation
</commit_message>
<xml_diff>
--- a/docs/SprintDemo/FinalPresentation.pptx
+++ b/docs/SprintDemo/FinalPresentation.pptx
@@ -16,7 +16,8 @@
     <p:sldId id="279" r:id="rId10"/>
     <p:sldId id="277" r:id="rId11"/>
     <p:sldId id="280" r:id="rId12"/>
-    <p:sldId id="282" r:id="rId13"/>
+    <p:sldId id="284" r:id="rId13"/>
+    <p:sldId id="282" r:id="rId14"/>
   </p:sldIdLst>
   <p:sldSz cx="12192000" cy="6858000"/>
   <p:notesSz cx="6858000" cy="9144000"/>
@@ -3518,7 +3519,7 @@
           <p:nvPr/>
         </p:nvPicPr>
         <p:blipFill>
-          <a:blip r:embed="rId2">
+          <a:blip r:embed="rId2" cstate="hqprint">
             <a:extLst>
               <a:ext uri="{28A0092B-C50C-407E-A947-70E740481C1C}">
                 <a14:useLocalDpi xmlns:a14="http://schemas.microsoft.com/office/drawing/2010/main" val="0"/>
@@ -3723,7 +3724,7 @@
           <p:nvPr/>
         </p:nvPicPr>
         <p:blipFill>
-          <a:blip r:embed="rId2">
+          <a:blip r:embed="rId2" cstate="hqprint">
             <a:extLst>
               <a:ext uri="{28A0092B-C50C-407E-A947-70E740481C1C}">
                 <a14:useLocalDpi xmlns:a14="http://schemas.microsoft.com/office/drawing/2010/main" val="0"/>
@@ -3875,7 +3876,189 @@
           <p:nvPr/>
         </p:nvPicPr>
         <p:blipFill>
-          <a:blip r:embed="rId2">
+          <a:blip r:embed="rId2" cstate="hqprint">
+            <a:extLst>
+              <a:ext uri="{28A0092B-C50C-407E-A947-70E740481C1C}">
+                <a14:useLocalDpi xmlns:a14="http://schemas.microsoft.com/office/drawing/2010/main" val="0"/>
+              </a:ext>
+            </a:extLst>
+          </a:blip>
+          <a:srcRect/>
+          <a:stretch>
+            <a:fillRect/>
+          </a:stretch>
+        </p:blipFill>
+        <p:spPr bwMode="auto">
+          <a:xfrm>
+            <a:off x="680675" y="5703240"/>
+            <a:ext cx="2551288" cy="1339426"/>
+          </a:xfrm>
+          <a:prstGeom prst="rect">
+            <a:avLst/>
+          </a:prstGeom>
+          <a:noFill/>
+          <a:extLst>
+            <a:ext uri="{909E8E84-426E-40DD-AFC4-6F175D3DCCD1}">
+              <a14:hiddenFill xmlns:a14="http://schemas.microsoft.com/office/drawing/2010/main">
+                <a:solidFill>
+                  <a:srgbClr val="FFFFFF"/>
+                </a:solidFill>
+              </a14:hiddenFill>
+            </a:ext>
+          </a:extLst>
+        </p:spPr>
+      </p:pic>
+      <p:sp>
+        <p:nvSpPr>
+          <p:cNvPr id="4" name="TextBox 3">
+            <a:extLst>
+              <a:ext uri="{FF2B5EF4-FFF2-40B4-BE49-F238E27FC236}">
+                <a16:creationId xmlns:a16="http://schemas.microsoft.com/office/drawing/2014/main" id="{B6CCF1F1-216B-4FDE-8477-127028475E8D}"/>
+              </a:ext>
+            </a:extLst>
+          </p:cNvPr>
+          <p:cNvSpPr txBox="1"/>
+          <p:nvPr/>
+        </p:nvSpPr>
+        <p:spPr>
+          <a:xfrm>
+            <a:off x="587023" y="5518574"/>
+            <a:ext cx="11604977" cy="369332"/>
+          </a:xfrm>
+          <a:prstGeom prst="rect">
+            <a:avLst/>
+          </a:prstGeom>
+          <a:noFill/>
+        </p:spPr>
+        <p:txBody>
+          <a:bodyPr wrap="square" rtlCol="0">
+            <a:spAutoFit/>
+          </a:bodyPr>
+          <a:lstStyle/>
+          <a:p>
+            <a:r>
+              <a:rPr lang="en-GB" dirty="0"/>
+              <a:t>_______________________________________________________________________________________________</a:t>
+            </a:r>
+            <a:endParaRPr lang="en-NL" dirty="0"/>
+          </a:p>
+        </p:txBody>
+      </p:sp>
+      <p:pic>
+        <p:nvPicPr>
+          <p:cNvPr id="2" name="Picture 1"/>
+          <p:cNvPicPr>
+            <a:picLocks noChangeAspect="1"/>
+          </p:cNvPicPr>
+          <p:nvPr/>
+        </p:nvPicPr>
+        <p:blipFill>
+          <a:blip r:embed="rId3" cstate="hqprint">
+            <a:extLst>
+              <a:ext uri="{28A0092B-C50C-407E-A947-70E740481C1C}">
+                <a14:useLocalDpi xmlns:a14="http://schemas.microsoft.com/office/drawing/2010/main" val="0"/>
+              </a:ext>
+            </a:extLst>
+          </a:blip>
+          <a:stretch>
+            <a:fillRect/>
+          </a:stretch>
+        </p:blipFill>
+        <p:spPr>
+          <a:xfrm>
+            <a:off x="2940241" y="367038"/>
+            <a:ext cx="8376943" cy="5336202"/>
+          </a:xfrm>
+          <a:prstGeom prst="rect">
+            <a:avLst/>
+          </a:prstGeom>
+        </p:spPr>
+      </p:pic>
+      <p:sp>
+        <p:nvSpPr>
+          <p:cNvPr id="3" name="TextBox 2"/>
+          <p:cNvSpPr txBox="1"/>
+          <p:nvPr/>
+        </p:nvSpPr>
+        <p:spPr>
+          <a:xfrm>
+            <a:off x="680675" y="367038"/>
+            <a:ext cx="2624446" cy="584775"/>
+          </a:xfrm>
+          <a:prstGeom prst="rect">
+            <a:avLst/>
+          </a:prstGeom>
+          <a:noFill/>
+        </p:spPr>
+        <p:txBody>
+          <a:bodyPr wrap="square" rtlCol="0">
+            <a:spAutoFit/>
+          </a:bodyPr>
+          <a:lstStyle/>
+          <a:p>
+            <a:r>
+              <a:rPr lang="en-US" sz="3200" b="1" dirty="0">
+                <a:latin typeface="Arial" panose="020B0604020202020204" pitchFamily="34" charset="0"/>
+                <a:cs typeface="Arial" panose="020B0604020202020204" pitchFamily="34" charset="0"/>
+              </a:rPr>
+              <a:t>Demo Setup</a:t>
+            </a:r>
+            <a:endParaRPr lang="en-US" sz="3200" b="1" dirty="0">
+              <a:latin typeface="Arial" panose="020B0604020202020204" pitchFamily="34" charset="0"/>
+              <a:cs typeface="Arial" panose="020B0604020202020204" pitchFamily="34" charset="0"/>
+            </a:endParaRPr>
+          </a:p>
+        </p:txBody>
+      </p:sp>
+    </p:spTree>
+    <p:extLst>
+      <p:ext uri="{BB962C8B-B14F-4D97-AF65-F5344CB8AC3E}">
+        <p14:creationId xmlns:p14="http://schemas.microsoft.com/office/powerpoint/2010/main" val="2903614992"/>
+      </p:ext>
+    </p:extLst>
+  </p:cSld>
+  <p:clrMapOvr>
+    <a:masterClrMapping/>
+  </p:clrMapOvr>
+  <p:transition>
+    <p:fade/>
+  </p:transition>
+</p:sld>
+</file>
+
+<file path=ppt/slides/slide13.xml><?xml version="1.0" encoding="utf-8"?>
+<p:sld xmlns:a="http://schemas.openxmlformats.org/drawingml/2006/main" xmlns:r="http://schemas.openxmlformats.org/officeDocument/2006/relationships" xmlns:p="http://schemas.openxmlformats.org/presentationml/2006/main">
+  <p:cSld>
+    <p:spTree>
+      <p:nvGrpSpPr>
+        <p:cNvPr id="1" name=""/>
+        <p:cNvGrpSpPr/>
+        <p:nvPr/>
+      </p:nvGrpSpPr>
+      <p:grpSpPr>
+        <a:xfrm>
+          <a:off x="0" y="0"/>
+          <a:ext cx="0" cy="0"/>
+          <a:chOff x="0" y="0"/>
+          <a:chExt cx="0" cy="0"/>
+        </a:xfrm>
+      </p:grpSpPr>
+      <p:pic>
+        <p:nvPicPr>
+          <p:cNvPr id="3074" name="Picture 2" descr="Airios I We build for comfort I Home">
+            <a:extLst>
+              <a:ext uri="{FF2B5EF4-FFF2-40B4-BE49-F238E27FC236}">
+                <a16:creationId xmlns:a16="http://schemas.microsoft.com/office/drawing/2014/main" id="{F04C1FE4-1909-40A5-ACBF-EBDA761AC14D}"/>
+              </a:ext>
+            </a:extLst>
+          </p:cNvPr>
+          <p:cNvPicPr>
+            <a:picLocks noChangeAspect="1" noChangeArrowheads="1"/>
+          </p:cNvPicPr>
+          <p:nvPr/>
+        </p:nvPicPr>
+        <p:blipFill>
+          <a:blip r:embed="rId2" cstate="hqprint">
             <a:extLst>
               <a:ext uri="{28A0092B-C50C-407E-A947-70E740481C1C}">
                 <a14:useLocalDpi xmlns:a14="http://schemas.microsoft.com/office/drawing/2010/main" val="0"/>
@@ -4068,7 +4251,7 @@
           <p:nvPr/>
         </p:nvPicPr>
         <p:blipFill>
-          <a:blip r:embed="rId2">
+          <a:blip r:embed="rId2" cstate="hqprint">
             <a:extLst>
               <a:ext uri="{28A0092B-C50C-407E-A947-70E740481C1C}">
                 <a14:useLocalDpi xmlns:a14="http://schemas.microsoft.com/office/drawing/2010/main" val="0"/>
@@ -4644,7 +4827,7 @@
           <p:nvPr/>
         </p:nvPicPr>
         <p:blipFill>
-          <a:blip r:embed="rId2">
+          <a:blip r:embed="rId2" cstate="hqprint">
             <a:extLst>
               <a:ext uri="{28A0092B-C50C-407E-A947-70E740481C1C}">
                 <a14:useLocalDpi xmlns:a14="http://schemas.microsoft.com/office/drawing/2010/main" val="0"/>
@@ -4908,7 +5091,7 @@
           <p:nvPr/>
         </p:nvPicPr>
         <p:blipFill>
-          <a:blip r:embed="rId2">
+          <a:blip r:embed="rId2" cstate="hqprint">
             <a:extLst>
               <a:ext uri="{28A0092B-C50C-407E-A947-70E740481C1C}">
                 <a14:useLocalDpi xmlns:a14="http://schemas.microsoft.com/office/drawing/2010/main" val="0"/>
@@ -5114,7 +5297,7 @@
           <p:nvPr/>
         </p:nvPicPr>
         <p:blipFill>
-          <a:blip r:embed="rId2">
+          <a:blip r:embed="rId2" cstate="hqprint">
             <a:extLst>
               <a:ext uri="{28A0092B-C50C-407E-A947-70E740481C1C}">
                 <a14:useLocalDpi xmlns:a14="http://schemas.microsoft.com/office/drawing/2010/main" val="0"/>
@@ -5304,7 +5487,7 @@
           <p:nvPr/>
         </p:nvPicPr>
         <p:blipFill>
-          <a:blip r:embed="rId2">
+          <a:blip r:embed="rId2" cstate="hqprint">
             <a:extLst>
               <a:ext uri="{28A0092B-C50C-407E-A947-70E740481C1C}">
                 <a14:useLocalDpi xmlns:a14="http://schemas.microsoft.com/office/drawing/2010/main" val="0"/>
@@ -5497,7 +5680,7 @@
           <p:nvPr/>
         </p:nvPicPr>
         <p:blipFill>
-          <a:blip r:embed="rId2">
+          <a:blip r:embed="rId2" cstate="hqprint">
             <a:extLst>
               <a:ext uri="{28A0092B-C50C-407E-A947-70E740481C1C}">
                 <a14:useLocalDpi xmlns:a14="http://schemas.microsoft.com/office/drawing/2010/main" val="0"/>
@@ -5765,7 +5948,7 @@
           <p:nvPr/>
         </p:nvPicPr>
         <p:blipFill>
-          <a:blip r:embed="rId2">
+          <a:blip r:embed="rId2" cstate="hqprint">
             <a:extLst>
               <a:ext uri="{28A0092B-C50C-407E-A947-70E740481C1C}">
                 <a14:useLocalDpi xmlns:a14="http://schemas.microsoft.com/office/drawing/2010/main" val="0"/>
@@ -5925,7 +6108,7 @@
           <p:nvPr/>
         </p:nvPicPr>
         <p:blipFill>
-          <a:blip r:embed="rId3">
+          <a:blip r:embed="rId3" cstate="hqprint">
             <a:extLst>
               <a:ext uri="{28A0092B-C50C-407E-A947-70E740481C1C}">
                 <a14:useLocalDpi xmlns:a14="http://schemas.microsoft.com/office/drawing/2010/main" val="0"/>

</xml_diff>